<commit_message>
Update Language Translator IT2324.pptx
</commit_message>
<xml_diff>
--- a/Language Translator IT2324.pptx
+++ b/Language Translator IT2324.pptx
@@ -5,11 +5,11 @@
     <p:sldMasterId id="2147483648" r:id="rId1"/>
   </p:sldMasterIdLst>
   <p:sldIdLst>
-    <p:sldId id="256" r:id="rId3"/>
-    <p:sldId id="257" r:id="rId4"/>
-    <p:sldId id="258" r:id="rId5"/>
-    <p:sldId id="259" r:id="rId6"/>
-    <p:sldId id="260" r:id="rId7"/>
+    <p:sldId id="256" r:id="rId2"/>
+    <p:sldId id="257" r:id="rId3"/>
+    <p:sldId id="258" r:id="rId4"/>
+    <p:sldId id="259" r:id="rId5"/>
+    <p:sldId id="260" r:id="rId6"/>
   </p:sldIdLst>
   <p:sldSz cx="12192000" cy="6858000"/>
   <p:notesSz cx="6858000" cy="9144000"/>
@@ -108,6 +108,11 @@
       </a:defRPr>
     </a:lvl9pPr>
   </p:defaultTextStyle>
+  <p:extLst>
+    <p:ext uri="{EFAFB233-063F-42B5-8137-9DF3F51BA10A}">
+      <p15:sldGuideLst xmlns:p15="http://schemas.microsoft.com/office/powerpoint/2012/main"/>
+    </p:ext>
+  </p:extLst>
 </p:presentation>
 </file>
 
@@ -153,10 +158,9 @@
           </a:lstStyle>
           <a:p>
             <a:r>
-              <a:rPr lang="en-US" smtClean="0"/>
+              <a:rPr lang="en-US"/>
               <a:t>Click to edit Master title style</a:t>
             </a:r>
-            <a:endParaRPr lang="en-US"/>
           </a:p>
         </p:txBody>
       </p:sp>
@@ -218,10 +222,9 @@
           </a:lstStyle>
           <a:p>
             <a:r>
-              <a:rPr lang="en-US" smtClean="0"/>
+              <a:rPr lang="en-US"/>
               <a:t>Click to edit Master subtitle style</a:t>
             </a:r>
-            <a:endParaRPr lang="en-US"/>
           </a:p>
         </p:txBody>
       </p:sp>
@@ -242,6 +245,7 @@
           <a:p>
             <a:fld id="{63A1C593-65D0-4073-BCC9-577B9352EA97}" type="datetimeFigureOut">
               <a:rPr lang="en-US" smtClean="0"/>
+              <a:t>6/8/2020</a:t>
             </a:fld>
             <a:endParaRPr lang="en-US"/>
           </a:p>
@@ -283,6 +287,7 @@
           <a:p>
             <a:fld id="{9B618960-8005-486C-9A75-10CB2AAC16F9}" type="slidenum">
               <a:rPr lang="en-US" smtClean="0"/>
+              <a:t>‹#›</a:t>
             </a:fld>
             <a:endParaRPr lang="en-US"/>
           </a:p>
@@ -329,10 +334,9 @@
           <a:lstStyle/>
           <a:p>
             <a:r>
-              <a:rPr lang="en-US" smtClean="0"/>
+              <a:rPr lang="en-US"/>
               <a:t>Click to edit Master title style</a:t>
             </a:r>
-            <a:endParaRPr lang="en-US"/>
           </a:p>
         </p:txBody>
       </p:sp>
@@ -353,42 +357,37 @@
           <a:p>
             <a:pPr lvl="0"/>
             <a:r>
-              <a:rPr lang="en-US" smtClean="0"/>
+              <a:rPr lang="en-US"/>
               <a:t>Click to edit Master text styles</a:t>
             </a:r>
-            <a:endParaRPr lang="en-US" smtClean="0"/>
           </a:p>
           <a:p>
             <a:pPr lvl="1"/>
             <a:r>
-              <a:rPr lang="en-US" smtClean="0"/>
+              <a:rPr lang="en-US"/>
               <a:t>Second level</a:t>
             </a:r>
-            <a:endParaRPr lang="en-US" smtClean="0"/>
           </a:p>
           <a:p>
             <a:pPr lvl="2"/>
             <a:r>
-              <a:rPr lang="en-US" smtClean="0"/>
+              <a:rPr lang="en-US"/>
               <a:t>Third level</a:t>
             </a:r>
-            <a:endParaRPr lang="en-US" smtClean="0"/>
           </a:p>
           <a:p>
             <a:pPr lvl="3"/>
             <a:r>
-              <a:rPr lang="en-US" smtClean="0"/>
+              <a:rPr lang="en-US"/>
               <a:t>Fourth level</a:t>
             </a:r>
-            <a:endParaRPr lang="en-US" smtClean="0"/>
           </a:p>
           <a:p>
             <a:pPr lvl="4"/>
             <a:r>
-              <a:rPr lang="en-US" smtClean="0"/>
+              <a:rPr lang="en-US"/>
               <a:t>Fifth level</a:t>
             </a:r>
-            <a:endParaRPr lang="en-US"/>
           </a:p>
         </p:txBody>
       </p:sp>
@@ -409,6 +408,7 @@
           <a:p>
             <a:fld id="{63A1C593-65D0-4073-BCC9-577B9352EA97}" type="datetimeFigureOut">
               <a:rPr lang="en-US" smtClean="0"/>
+              <a:t>6/8/2020</a:t>
             </a:fld>
             <a:endParaRPr lang="en-US"/>
           </a:p>
@@ -450,6 +450,7 @@
           <a:p>
             <a:fld id="{9B618960-8005-486C-9A75-10CB2AAC16F9}" type="slidenum">
               <a:rPr lang="en-US" smtClean="0"/>
+              <a:t>‹#›</a:t>
             </a:fld>
             <a:endParaRPr lang="en-US"/>
           </a:p>
@@ -501,10 +502,9 @@
           <a:lstStyle/>
           <a:p>
             <a:r>
-              <a:rPr lang="en-US" smtClean="0"/>
+              <a:rPr lang="en-US"/>
               <a:t>Click to edit Master title style</a:t>
             </a:r>
-            <a:endParaRPr lang="en-US"/>
           </a:p>
         </p:txBody>
       </p:sp>
@@ -530,42 +530,37 @@
           <a:p>
             <a:pPr lvl="0"/>
             <a:r>
-              <a:rPr lang="en-US" smtClean="0"/>
+              <a:rPr lang="en-US"/>
               <a:t>Click to edit Master text styles</a:t>
             </a:r>
-            <a:endParaRPr lang="en-US" smtClean="0"/>
           </a:p>
           <a:p>
             <a:pPr lvl="1"/>
             <a:r>
-              <a:rPr lang="en-US" smtClean="0"/>
+              <a:rPr lang="en-US"/>
               <a:t>Second level</a:t>
             </a:r>
-            <a:endParaRPr lang="en-US" smtClean="0"/>
           </a:p>
           <a:p>
             <a:pPr lvl="2"/>
             <a:r>
-              <a:rPr lang="en-US" smtClean="0"/>
+              <a:rPr lang="en-US"/>
               <a:t>Third level</a:t>
             </a:r>
-            <a:endParaRPr lang="en-US" smtClean="0"/>
           </a:p>
           <a:p>
             <a:pPr lvl="3"/>
             <a:r>
-              <a:rPr lang="en-US" smtClean="0"/>
+              <a:rPr lang="en-US"/>
               <a:t>Fourth level</a:t>
             </a:r>
-            <a:endParaRPr lang="en-US" smtClean="0"/>
           </a:p>
           <a:p>
             <a:pPr lvl="4"/>
             <a:r>
-              <a:rPr lang="en-US" smtClean="0"/>
+              <a:rPr lang="en-US"/>
               <a:t>Fifth level</a:t>
             </a:r>
-            <a:endParaRPr lang="en-US"/>
           </a:p>
         </p:txBody>
       </p:sp>
@@ -586,6 +581,7 @@
           <a:p>
             <a:fld id="{63A1C593-65D0-4073-BCC9-577B9352EA97}" type="datetimeFigureOut">
               <a:rPr lang="en-US" smtClean="0"/>
+              <a:t>6/8/2020</a:t>
             </a:fld>
             <a:endParaRPr lang="en-US"/>
           </a:p>
@@ -627,6 +623,7 @@
           <a:p>
             <a:fld id="{9B618960-8005-486C-9A75-10CB2AAC16F9}" type="slidenum">
               <a:rPr lang="en-US" smtClean="0"/>
+              <a:t>‹#›</a:t>
             </a:fld>
             <a:endParaRPr lang="en-US"/>
           </a:p>
@@ -673,10 +670,9 @@
           <a:lstStyle/>
           <a:p>
             <a:r>
-              <a:rPr lang="en-US" smtClean="0"/>
+              <a:rPr lang="en-US"/>
               <a:t>Click to edit Master title style</a:t>
             </a:r>
-            <a:endParaRPr lang="en-US"/>
           </a:p>
         </p:txBody>
       </p:sp>
@@ -697,42 +693,37 @@
           <a:p>
             <a:pPr lvl="0"/>
             <a:r>
-              <a:rPr lang="en-US" smtClean="0"/>
+              <a:rPr lang="en-US"/>
               <a:t>Click to edit Master text styles</a:t>
             </a:r>
-            <a:endParaRPr lang="en-US" smtClean="0"/>
           </a:p>
           <a:p>
             <a:pPr lvl="1"/>
             <a:r>
-              <a:rPr lang="en-US" smtClean="0"/>
+              <a:rPr lang="en-US"/>
               <a:t>Second level</a:t>
             </a:r>
-            <a:endParaRPr lang="en-US" smtClean="0"/>
           </a:p>
           <a:p>
             <a:pPr lvl="2"/>
             <a:r>
-              <a:rPr lang="en-US" smtClean="0"/>
+              <a:rPr lang="en-US"/>
               <a:t>Third level</a:t>
             </a:r>
-            <a:endParaRPr lang="en-US" smtClean="0"/>
           </a:p>
           <a:p>
             <a:pPr lvl="3"/>
             <a:r>
-              <a:rPr lang="en-US" smtClean="0"/>
+              <a:rPr lang="en-US"/>
               <a:t>Fourth level</a:t>
             </a:r>
-            <a:endParaRPr lang="en-US" smtClean="0"/>
           </a:p>
           <a:p>
             <a:pPr lvl="4"/>
             <a:r>
-              <a:rPr lang="en-US" smtClean="0"/>
+              <a:rPr lang="en-US"/>
               <a:t>Fifth level</a:t>
             </a:r>
-            <a:endParaRPr lang="en-US"/>
           </a:p>
         </p:txBody>
       </p:sp>
@@ -753,6 +744,7 @@
           <a:p>
             <a:fld id="{63A1C593-65D0-4073-BCC9-577B9352EA97}" type="datetimeFigureOut">
               <a:rPr lang="en-US" smtClean="0"/>
+              <a:t>6/8/2020</a:t>
             </a:fld>
             <a:endParaRPr lang="en-US"/>
           </a:p>
@@ -794,6 +786,7 @@
           <a:p>
             <a:fld id="{9B618960-8005-486C-9A75-10CB2AAC16F9}" type="slidenum">
               <a:rPr lang="en-US" smtClean="0"/>
+              <a:t>‹#›</a:t>
             </a:fld>
             <a:endParaRPr lang="en-US"/>
           </a:p>
@@ -849,10 +842,9 @@
           </a:lstStyle>
           <a:p>
             <a:r>
-              <a:rPr lang="en-US" smtClean="0"/>
+              <a:rPr lang="en-US"/>
               <a:t>Click to edit Master title style</a:t>
             </a:r>
-            <a:endParaRPr lang="en-US"/>
           </a:p>
         </p:txBody>
       </p:sp>
@@ -969,10 +961,9 @@
           <a:p>
             <a:pPr lvl="0"/>
             <a:r>
-              <a:rPr lang="en-US" smtClean="0"/>
+              <a:rPr lang="en-US"/>
               <a:t>Click to edit Master text styles</a:t>
             </a:r>
-            <a:endParaRPr lang="en-US" smtClean="0"/>
           </a:p>
         </p:txBody>
       </p:sp>
@@ -993,6 +984,7 @@
           <a:p>
             <a:fld id="{63A1C593-65D0-4073-BCC9-577B9352EA97}" type="datetimeFigureOut">
               <a:rPr lang="en-US" smtClean="0"/>
+              <a:t>6/8/2020</a:t>
             </a:fld>
             <a:endParaRPr lang="en-US"/>
           </a:p>
@@ -1034,6 +1026,7 @@
           <a:p>
             <a:fld id="{9B618960-8005-486C-9A75-10CB2AAC16F9}" type="slidenum">
               <a:rPr lang="en-US" smtClean="0"/>
+              <a:t>‹#›</a:t>
             </a:fld>
             <a:endParaRPr lang="en-US"/>
           </a:p>
@@ -1080,10 +1073,9 @@
           <a:lstStyle/>
           <a:p>
             <a:r>
-              <a:rPr lang="en-US" smtClean="0"/>
+              <a:rPr lang="en-US"/>
               <a:t>Click to edit Master title style</a:t>
             </a:r>
-            <a:endParaRPr lang="en-US"/>
           </a:p>
         </p:txBody>
       </p:sp>
@@ -1109,42 +1101,37 @@
           <a:p>
             <a:pPr lvl="0"/>
             <a:r>
-              <a:rPr lang="en-US" smtClean="0"/>
+              <a:rPr lang="en-US"/>
               <a:t>Click to edit Master text styles</a:t>
             </a:r>
-            <a:endParaRPr lang="en-US" smtClean="0"/>
           </a:p>
           <a:p>
             <a:pPr lvl="1"/>
             <a:r>
-              <a:rPr lang="en-US" smtClean="0"/>
+              <a:rPr lang="en-US"/>
               <a:t>Second level</a:t>
             </a:r>
-            <a:endParaRPr lang="en-US" smtClean="0"/>
           </a:p>
           <a:p>
             <a:pPr lvl="2"/>
             <a:r>
-              <a:rPr lang="en-US" smtClean="0"/>
+              <a:rPr lang="en-US"/>
               <a:t>Third level</a:t>
             </a:r>
-            <a:endParaRPr lang="en-US" smtClean="0"/>
           </a:p>
           <a:p>
             <a:pPr lvl="3"/>
             <a:r>
-              <a:rPr lang="en-US" smtClean="0"/>
+              <a:rPr lang="en-US"/>
               <a:t>Fourth level</a:t>
             </a:r>
-            <a:endParaRPr lang="en-US" smtClean="0"/>
           </a:p>
           <a:p>
             <a:pPr lvl="4"/>
             <a:r>
-              <a:rPr lang="en-US" smtClean="0"/>
+              <a:rPr lang="en-US"/>
               <a:t>Fifth level</a:t>
             </a:r>
-            <a:endParaRPr lang="en-US"/>
           </a:p>
         </p:txBody>
       </p:sp>
@@ -1170,42 +1157,37 @@
           <a:p>
             <a:pPr lvl="0"/>
             <a:r>
-              <a:rPr lang="en-US" smtClean="0"/>
+              <a:rPr lang="en-US"/>
               <a:t>Click to edit Master text styles</a:t>
             </a:r>
-            <a:endParaRPr lang="en-US" smtClean="0"/>
           </a:p>
           <a:p>
             <a:pPr lvl="1"/>
             <a:r>
-              <a:rPr lang="en-US" smtClean="0"/>
+              <a:rPr lang="en-US"/>
               <a:t>Second level</a:t>
             </a:r>
-            <a:endParaRPr lang="en-US" smtClean="0"/>
           </a:p>
           <a:p>
             <a:pPr lvl="2"/>
             <a:r>
-              <a:rPr lang="en-US" smtClean="0"/>
+              <a:rPr lang="en-US"/>
               <a:t>Third level</a:t>
             </a:r>
-            <a:endParaRPr lang="en-US" smtClean="0"/>
           </a:p>
           <a:p>
             <a:pPr lvl="3"/>
             <a:r>
-              <a:rPr lang="en-US" smtClean="0"/>
+              <a:rPr lang="en-US"/>
               <a:t>Fourth level</a:t>
             </a:r>
-            <a:endParaRPr lang="en-US" smtClean="0"/>
           </a:p>
           <a:p>
             <a:pPr lvl="4"/>
             <a:r>
-              <a:rPr lang="en-US" smtClean="0"/>
+              <a:rPr lang="en-US"/>
               <a:t>Fifth level</a:t>
             </a:r>
-            <a:endParaRPr lang="en-US"/>
           </a:p>
         </p:txBody>
       </p:sp>
@@ -1226,6 +1208,7 @@
           <a:p>
             <a:fld id="{63A1C593-65D0-4073-BCC9-577B9352EA97}" type="datetimeFigureOut">
               <a:rPr lang="en-US" smtClean="0"/>
+              <a:t>6/8/2020</a:t>
             </a:fld>
             <a:endParaRPr lang="en-US"/>
           </a:p>
@@ -1267,6 +1250,7 @@
           <a:p>
             <a:fld id="{9B618960-8005-486C-9A75-10CB2AAC16F9}" type="slidenum">
               <a:rPr lang="en-US" smtClean="0"/>
+              <a:t>‹#›</a:t>
             </a:fld>
             <a:endParaRPr lang="en-US"/>
           </a:p>
@@ -1318,10 +1302,9 @@
           <a:lstStyle/>
           <a:p>
             <a:r>
-              <a:rPr lang="en-US" smtClean="0"/>
+              <a:rPr lang="en-US"/>
               <a:t>Click to edit Master title style</a:t>
             </a:r>
-            <a:endParaRPr lang="en-US"/>
           </a:p>
         </p:txBody>
       </p:sp>
@@ -1384,10 +1367,9 @@
           <a:p>
             <a:pPr lvl="0"/>
             <a:r>
-              <a:rPr lang="en-US" smtClean="0"/>
+              <a:rPr lang="en-US"/>
               <a:t>Click to edit Master text styles</a:t>
             </a:r>
-            <a:endParaRPr lang="en-US" smtClean="0"/>
           </a:p>
         </p:txBody>
       </p:sp>
@@ -1413,42 +1395,37 @@
           <a:p>
             <a:pPr lvl="0"/>
             <a:r>
-              <a:rPr lang="en-US" smtClean="0"/>
+              <a:rPr lang="en-US"/>
               <a:t>Click to edit Master text styles</a:t>
             </a:r>
-            <a:endParaRPr lang="en-US" smtClean="0"/>
           </a:p>
           <a:p>
             <a:pPr lvl="1"/>
             <a:r>
-              <a:rPr lang="en-US" smtClean="0"/>
+              <a:rPr lang="en-US"/>
               <a:t>Second level</a:t>
             </a:r>
-            <a:endParaRPr lang="en-US" smtClean="0"/>
           </a:p>
           <a:p>
             <a:pPr lvl="2"/>
             <a:r>
-              <a:rPr lang="en-US" smtClean="0"/>
+              <a:rPr lang="en-US"/>
               <a:t>Third level</a:t>
             </a:r>
-            <a:endParaRPr lang="en-US" smtClean="0"/>
           </a:p>
           <a:p>
             <a:pPr lvl="3"/>
             <a:r>
-              <a:rPr lang="en-US" smtClean="0"/>
+              <a:rPr lang="en-US"/>
               <a:t>Fourth level</a:t>
             </a:r>
-            <a:endParaRPr lang="en-US" smtClean="0"/>
           </a:p>
           <a:p>
             <a:pPr lvl="4"/>
             <a:r>
-              <a:rPr lang="en-US" smtClean="0"/>
+              <a:rPr lang="en-US"/>
               <a:t>Fifth level</a:t>
             </a:r>
-            <a:endParaRPr lang="en-US"/>
           </a:p>
         </p:txBody>
       </p:sp>
@@ -1511,10 +1488,9 @@
           <a:p>
             <a:pPr lvl="0"/>
             <a:r>
-              <a:rPr lang="en-US" smtClean="0"/>
+              <a:rPr lang="en-US"/>
               <a:t>Click to edit Master text styles</a:t>
             </a:r>
-            <a:endParaRPr lang="en-US" smtClean="0"/>
           </a:p>
         </p:txBody>
       </p:sp>
@@ -1540,42 +1516,37 @@
           <a:p>
             <a:pPr lvl="0"/>
             <a:r>
-              <a:rPr lang="en-US" smtClean="0"/>
+              <a:rPr lang="en-US"/>
               <a:t>Click to edit Master text styles</a:t>
             </a:r>
-            <a:endParaRPr lang="en-US" smtClean="0"/>
           </a:p>
           <a:p>
             <a:pPr lvl="1"/>
             <a:r>
-              <a:rPr lang="en-US" smtClean="0"/>
+              <a:rPr lang="en-US"/>
               <a:t>Second level</a:t>
             </a:r>
-            <a:endParaRPr lang="en-US" smtClean="0"/>
           </a:p>
           <a:p>
             <a:pPr lvl="2"/>
             <a:r>
-              <a:rPr lang="en-US" smtClean="0"/>
+              <a:rPr lang="en-US"/>
               <a:t>Third level</a:t>
             </a:r>
-            <a:endParaRPr lang="en-US" smtClean="0"/>
           </a:p>
           <a:p>
             <a:pPr lvl="3"/>
             <a:r>
-              <a:rPr lang="en-US" smtClean="0"/>
+              <a:rPr lang="en-US"/>
               <a:t>Fourth level</a:t>
             </a:r>
-            <a:endParaRPr lang="en-US" smtClean="0"/>
           </a:p>
           <a:p>
             <a:pPr lvl="4"/>
             <a:r>
-              <a:rPr lang="en-US" smtClean="0"/>
+              <a:rPr lang="en-US"/>
               <a:t>Fifth level</a:t>
             </a:r>
-            <a:endParaRPr lang="en-US"/>
           </a:p>
         </p:txBody>
       </p:sp>
@@ -1596,6 +1567,7 @@
           <a:p>
             <a:fld id="{63A1C593-65D0-4073-BCC9-577B9352EA97}" type="datetimeFigureOut">
               <a:rPr lang="en-US" smtClean="0"/>
+              <a:t>6/8/2020</a:t>
             </a:fld>
             <a:endParaRPr lang="en-US"/>
           </a:p>
@@ -1637,6 +1609,7 @@
           <a:p>
             <a:fld id="{9B618960-8005-486C-9A75-10CB2AAC16F9}" type="slidenum">
               <a:rPr lang="en-US" smtClean="0"/>
+              <a:t>‹#›</a:t>
             </a:fld>
             <a:endParaRPr lang="en-US"/>
           </a:p>
@@ -1683,10 +1656,9 @@
           <a:lstStyle/>
           <a:p>
             <a:r>
-              <a:rPr lang="en-US" smtClean="0"/>
+              <a:rPr lang="en-US"/>
               <a:t>Click to edit Master title style</a:t>
             </a:r>
-            <a:endParaRPr lang="en-US"/>
           </a:p>
         </p:txBody>
       </p:sp>
@@ -1707,6 +1679,7 @@
           <a:p>
             <a:fld id="{63A1C593-65D0-4073-BCC9-577B9352EA97}" type="datetimeFigureOut">
               <a:rPr lang="en-US" smtClean="0"/>
+              <a:t>6/8/2020</a:t>
             </a:fld>
             <a:endParaRPr lang="en-US"/>
           </a:p>
@@ -1748,6 +1721,7 @@
           <a:p>
             <a:fld id="{9B618960-8005-486C-9A75-10CB2AAC16F9}" type="slidenum">
               <a:rPr lang="en-US" smtClean="0"/>
+              <a:t>‹#›</a:t>
             </a:fld>
             <a:endParaRPr lang="en-US"/>
           </a:p>
@@ -1795,6 +1769,7 @@
           <a:p>
             <a:fld id="{63A1C593-65D0-4073-BCC9-577B9352EA97}" type="datetimeFigureOut">
               <a:rPr lang="en-US" smtClean="0"/>
+              <a:t>6/8/2020</a:t>
             </a:fld>
             <a:endParaRPr lang="en-US"/>
           </a:p>
@@ -1836,6 +1811,7 @@
           <a:p>
             <a:fld id="{9B618960-8005-486C-9A75-10CB2AAC16F9}" type="slidenum">
               <a:rPr lang="en-US" smtClean="0"/>
+              <a:t>‹#›</a:t>
             </a:fld>
             <a:endParaRPr lang="en-US"/>
           </a:p>
@@ -1891,10 +1867,9 @@
           </a:lstStyle>
           <a:p>
             <a:r>
-              <a:rPr lang="en-US" smtClean="0"/>
+              <a:rPr lang="en-US"/>
               <a:t>Click to edit Master title style</a:t>
             </a:r>
-            <a:endParaRPr lang="en-US"/>
           </a:p>
         </p:txBody>
       </p:sp>
@@ -1948,42 +1923,37 @@
           <a:p>
             <a:pPr lvl="0"/>
             <a:r>
-              <a:rPr lang="en-US" smtClean="0"/>
+              <a:rPr lang="en-US"/>
               <a:t>Click to edit Master text styles</a:t>
             </a:r>
-            <a:endParaRPr lang="en-US" smtClean="0"/>
           </a:p>
           <a:p>
             <a:pPr lvl="1"/>
             <a:r>
-              <a:rPr lang="en-US" smtClean="0"/>
+              <a:rPr lang="en-US"/>
               <a:t>Second level</a:t>
             </a:r>
-            <a:endParaRPr lang="en-US" smtClean="0"/>
           </a:p>
           <a:p>
             <a:pPr lvl="2"/>
             <a:r>
-              <a:rPr lang="en-US" smtClean="0"/>
+              <a:rPr lang="en-US"/>
               <a:t>Third level</a:t>
             </a:r>
-            <a:endParaRPr lang="en-US" smtClean="0"/>
           </a:p>
           <a:p>
             <a:pPr lvl="3"/>
             <a:r>
-              <a:rPr lang="en-US" smtClean="0"/>
+              <a:rPr lang="en-US"/>
               <a:t>Fourth level</a:t>
             </a:r>
-            <a:endParaRPr lang="en-US" smtClean="0"/>
           </a:p>
           <a:p>
             <a:pPr lvl="4"/>
             <a:r>
-              <a:rPr lang="en-US" smtClean="0"/>
+              <a:rPr lang="en-US"/>
               <a:t>Fifth level</a:t>
             </a:r>
-            <a:endParaRPr lang="en-US"/>
           </a:p>
         </p:txBody>
       </p:sp>
@@ -2046,10 +2016,9 @@
           <a:p>
             <a:pPr lvl="0"/>
             <a:r>
-              <a:rPr lang="en-US" smtClean="0"/>
+              <a:rPr lang="en-US"/>
               <a:t>Click to edit Master text styles</a:t>
             </a:r>
-            <a:endParaRPr lang="en-US" smtClean="0"/>
           </a:p>
         </p:txBody>
       </p:sp>
@@ -2070,6 +2039,7 @@
           <a:p>
             <a:fld id="{63A1C593-65D0-4073-BCC9-577B9352EA97}" type="datetimeFigureOut">
               <a:rPr lang="en-US" smtClean="0"/>
+              <a:t>6/8/2020</a:t>
             </a:fld>
             <a:endParaRPr lang="en-US"/>
           </a:p>
@@ -2111,6 +2081,7 @@
           <a:p>
             <a:fld id="{9B618960-8005-486C-9A75-10CB2AAC16F9}" type="slidenum">
               <a:rPr lang="en-US" smtClean="0"/>
+              <a:t>‹#›</a:t>
             </a:fld>
             <a:endParaRPr lang="en-US"/>
           </a:p>
@@ -2166,10 +2137,9 @@
           </a:lstStyle>
           <a:p>
             <a:r>
-              <a:rPr lang="en-US" smtClean="0"/>
+              <a:rPr lang="en-US"/>
               <a:t>Click to edit Master title style</a:t>
             </a:r>
-            <a:endParaRPr lang="en-US"/>
           </a:p>
         </p:txBody>
       </p:sp>
@@ -2293,10 +2263,9 @@
           <a:p>
             <a:pPr lvl="0"/>
             <a:r>
-              <a:rPr lang="en-US" smtClean="0"/>
+              <a:rPr lang="en-US"/>
               <a:t>Click to edit Master text styles</a:t>
             </a:r>
-            <a:endParaRPr lang="en-US" smtClean="0"/>
           </a:p>
         </p:txBody>
       </p:sp>
@@ -2317,6 +2286,7 @@
           <a:p>
             <a:fld id="{63A1C593-65D0-4073-BCC9-577B9352EA97}" type="datetimeFigureOut">
               <a:rPr lang="en-US" smtClean="0"/>
+              <a:t>6/8/2020</a:t>
             </a:fld>
             <a:endParaRPr lang="en-US"/>
           </a:p>
@@ -2358,6 +2328,7 @@
           <a:p>
             <a:fld id="{9B618960-8005-486C-9A75-10CB2AAC16F9}" type="slidenum">
               <a:rPr lang="en-US" smtClean="0"/>
+              <a:t>‹#›</a:t>
             </a:fld>
             <a:endParaRPr lang="en-US"/>
           </a:p>
@@ -2419,10 +2390,9 @@
           <a:lstStyle/>
           <a:p>
             <a:r>
-              <a:rPr lang="en-US" smtClean="0"/>
+              <a:rPr lang="en-US"/>
               <a:t>Click to edit Master title style</a:t>
             </a:r>
-            <a:endParaRPr lang="en-US"/>
           </a:p>
         </p:txBody>
       </p:sp>
@@ -2453,42 +2423,37 @@
           <a:p>
             <a:pPr lvl="0"/>
             <a:r>
-              <a:rPr lang="en-US" smtClean="0"/>
+              <a:rPr lang="en-US"/>
               <a:t>Click to edit Master text styles</a:t>
             </a:r>
-            <a:endParaRPr lang="en-US" smtClean="0"/>
           </a:p>
           <a:p>
             <a:pPr lvl="1"/>
             <a:r>
-              <a:rPr lang="en-US" smtClean="0"/>
+              <a:rPr lang="en-US"/>
               <a:t>Second level</a:t>
             </a:r>
-            <a:endParaRPr lang="en-US" smtClean="0"/>
           </a:p>
           <a:p>
             <a:pPr lvl="2"/>
             <a:r>
-              <a:rPr lang="en-US" smtClean="0"/>
+              <a:rPr lang="en-US"/>
               <a:t>Third level</a:t>
             </a:r>
-            <a:endParaRPr lang="en-US" smtClean="0"/>
           </a:p>
           <a:p>
             <a:pPr lvl="3"/>
             <a:r>
-              <a:rPr lang="en-US" smtClean="0"/>
+              <a:rPr lang="en-US"/>
               <a:t>Fourth level</a:t>
             </a:r>
-            <a:endParaRPr lang="en-US" smtClean="0"/>
           </a:p>
           <a:p>
             <a:pPr lvl="4"/>
             <a:r>
-              <a:rPr lang="en-US" smtClean="0"/>
+              <a:rPr lang="en-US"/>
               <a:t>Fifth level</a:t>
             </a:r>
-            <a:endParaRPr lang="en-US"/>
           </a:p>
         </p:txBody>
       </p:sp>
@@ -2527,6 +2492,7 @@
           <a:p>
             <a:fld id="{63A1C593-65D0-4073-BCC9-577B9352EA97}" type="datetimeFigureOut">
               <a:rPr lang="en-US" smtClean="0"/>
+              <a:t>6/8/2020</a:t>
             </a:fld>
             <a:endParaRPr lang="en-US"/>
           </a:p>
@@ -2604,6 +2570,7 @@
           <a:p>
             <a:fld id="{9B618960-8005-486C-9A75-10CB2AAC16F9}" type="slidenum">
               <a:rPr lang="en-US" smtClean="0"/>
+              <a:t>‹#›</a:t>
             </a:fld>
             <a:endParaRPr lang="en-US"/>
           </a:p>
@@ -3020,7 +2987,14 @@
         <p:cNvGrpSpPr/>
         <p:nvPr/>
       </p:nvGrpSpPr>
-      <p:grpSpPr/>
+      <p:grpSpPr>
+        <a:xfrm>
+          <a:off x="0" y="0"/>
+          <a:ext cx="0" cy="0"/>
+          <a:chOff x="0" y="0"/>
+          <a:chExt cx="0" cy="0"/>
+        </a:xfrm>
+      </p:grpSpPr>
       <p:sp>
         <p:nvSpPr>
           <p:cNvPr id="2" name="Title 1"/>
@@ -3036,6 +3010,7 @@
           <a:bodyPr>
             <a:normAutofit fontScale="90000"/>
           </a:bodyPr>
+          <a:lstStyle/>
           <a:p>
             <a:r>
               <a:rPr lang="en-IN" altLang="en-US">
@@ -3068,43 +3043,54 @@
         </p:spPr>
         <p:txBody>
           <a:bodyPr/>
-          <a:p>
+          <a:lstStyle/>
+          <a:p>
+            <a:r>
+              <a:rPr lang="en-IN" altLang="en-US" dirty="0"/>
+              <a:t>Our </a:t>
+            </a:r>
             <a:r>
               <a:rPr lang="en-IN" altLang="en-US"/>
-              <a:t>Our language is very simple, it identifies the strings made up of 'a' and 'b' in a specific sequence.</a:t>
-            </a:r>
-            <a:endParaRPr lang="en-IN" altLang="en-US"/>
-          </a:p>
-          <a:p>
-            <a:r>
-              <a:rPr lang="en-IN" altLang="en-US"/>
-              <a:t>L: {a</a:t>
-            </a:r>
-            <a:r>
-              <a:rPr lang="en-IN" altLang="en-US" baseline="30000"/>
+              <a:t>language identifies </a:t>
+            </a:r>
+            <a:r>
+              <a:rPr lang="en-IN" altLang="en-US" dirty="0"/>
+              <a:t>the strings made up of 'a' and 'b' in a specific sequence.</a:t>
+            </a:r>
+          </a:p>
+          <a:p>
+            <a:r>
+              <a:rPr lang="en-IN" altLang="en-US" dirty="0"/>
+              <a:t>L: {</a:t>
+            </a:r>
+            <a:r>
+              <a:rPr lang="en-IN" altLang="en-US" dirty="0" err="1"/>
+              <a:t>a</a:t>
+            </a:r>
+            <a:r>
+              <a:rPr lang="en-IN" altLang="en-US" baseline="30000" dirty="0" err="1"/>
               <a:t>m</a:t>
             </a:r>
             <a:r>
-              <a:rPr lang="en-IN" altLang="en-US"/>
+              <a:rPr lang="en-IN" altLang="en-US" dirty="0" err="1"/>
               <a:t>b</a:t>
             </a:r>
             <a:r>
-              <a:rPr lang="en-IN" altLang="en-US" baseline="30000"/>
+              <a:rPr lang="en-IN" altLang="en-US" baseline="30000" dirty="0" err="1"/>
               <a:t>n</a:t>
             </a:r>
             <a:r>
-              <a:rPr lang="en-IN" altLang="en-US"/>
+              <a:rPr lang="en-IN" altLang="en-US" dirty="0"/>
               <a:t> | m&gt;2&amp;n&gt;1 &amp; m-n=1}</a:t>
             </a:r>
-            <a:endParaRPr lang="en-IN" altLang="en-US"/>
           </a:p>
           <a:p>
             <a:pPr lvl="1"/>
             <a:r>
-              <a:rPr lang="en-IN" altLang="en-US" sz="2800"/>
+              <a:rPr lang="en-IN" altLang="en-US" sz="2800" dirty="0"/>
               <a:t>Example(valid)</a:t>
             </a:r>
-            <a:endParaRPr lang="en-IN" altLang="en-US"/>
+            <a:endParaRPr lang="en-IN" altLang="en-US" dirty="0"/>
           </a:p>
           <a:p>
             <a:pPr marL="1371600" lvl="2" indent="-457200">
@@ -3112,10 +3098,10 @@
               <a:buAutoNum type="romanLcPeriod"/>
             </a:pPr>
             <a:r>
-              <a:rPr lang="en-IN" altLang="en-US" sz="2400"/>
+              <a:rPr lang="en-IN" altLang="en-US" sz="2400" dirty="0" err="1"/>
               <a:t>aaabb</a:t>
             </a:r>
-            <a:endParaRPr lang="en-IN" altLang="en-US" sz="2400"/>
+            <a:endParaRPr lang="en-IN" altLang="en-US" sz="2400" dirty="0"/>
           </a:p>
           <a:p>
             <a:pPr marL="1371600" lvl="2" indent="-457200">
@@ -3123,18 +3109,17 @@
               <a:buAutoNum type="romanLcPeriod"/>
             </a:pPr>
             <a:r>
-              <a:rPr lang="en-IN" altLang="en-US" sz="2400"/>
+              <a:rPr lang="en-IN" altLang="en-US" sz="2400" dirty="0" err="1"/>
               <a:t>aaaabbb</a:t>
             </a:r>
-            <a:endParaRPr lang="en-IN" altLang="en-US" sz="2400"/>
+            <a:endParaRPr lang="en-IN" altLang="en-US" sz="2400" dirty="0"/>
           </a:p>
           <a:p>
             <a:pPr lvl="1" algn="l"/>
             <a:r>
-              <a:rPr lang="en-IN" altLang="en-US" sz="2800"/>
+              <a:rPr lang="en-IN" altLang="en-US" sz="2800" dirty="0"/>
               <a:t>Example(invalid)</a:t>
             </a:r>
-            <a:endParaRPr lang="en-IN" altLang="en-US" sz="2800"/>
           </a:p>
           <a:p>
             <a:pPr marL="1428750" lvl="2" indent="-514350" algn="l">
@@ -3142,10 +3127,10 @@
               <a:buAutoNum type="romanLcPeriod"/>
             </a:pPr>
             <a:r>
-              <a:rPr lang="en-IN" altLang="en-US" sz="2400"/>
+              <a:rPr lang="en-IN" altLang="en-US" sz="2400" dirty="0" err="1"/>
               <a:t>aaaaaabb</a:t>
             </a:r>
-            <a:endParaRPr lang="en-IN" altLang="en-US" sz="2400"/>
+            <a:endParaRPr lang="en-IN" altLang="en-US" sz="2400" dirty="0"/>
           </a:p>
           <a:p>
             <a:pPr marL="1428750" lvl="2" indent="-514350" algn="l">
@@ -3153,10 +3138,10 @@
               <a:buAutoNum type="romanLcPeriod"/>
             </a:pPr>
             <a:r>
-              <a:rPr lang="en-IN" altLang="en-US" sz="2400"/>
+              <a:rPr lang="en-IN" altLang="en-US" sz="2400" dirty="0" err="1"/>
               <a:t>aaabbbb</a:t>
             </a:r>
-            <a:endParaRPr lang="en-IN" altLang="en-US" sz="2400"/>
+            <a:endParaRPr lang="en-IN" altLang="en-US" sz="2400" dirty="0"/>
           </a:p>
           <a:p>
             <a:pPr marL="1428750" lvl="2" indent="-514350" algn="l">
@@ -3164,10 +3149,10 @@
               <a:buAutoNum type="romanLcPeriod"/>
             </a:pPr>
             <a:r>
-              <a:rPr lang="en-IN" altLang="en-US" sz="2400"/>
+              <a:rPr lang="en-IN" altLang="en-US" sz="2400" dirty="0" err="1"/>
               <a:t>aaabbb</a:t>
             </a:r>
-            <a:endParaRPr lang="en-IN" altLang="en-US" sz="2400"/>
+            <a:endParaRPr lang="en-IN" altLang="en-US" sz="2400" dirty="0"/>
           </a:p>
         </p:txBody>
       </p:sp>
@@ -3188,7 +3173,14 @@
         <p:cNvGrpSpPr/>
         <p:nvPr/>
       </p:nvGrpSpPr>
-      <p:grpSpPr/>
+      <p:grpSpPr>
+        <a:xfrm>
+          <a:off x="0" y="0"/>
+          <a:ext cx="0" cy="0"/>
+          <a:chOff x="0" y="0"/>
+          <a:chExt cx="0" cy="0"/>
+        </a:xfrm>
+      </p:grpSpPr>
       <p:sp>
         <p:nvSpPr>
           <p:cNvPr id="2" name="Title 1"/>
@@ -3202,12 +3194,12 @@
         <p:spPr/>
         <p:txBody>
           <a:bodyPr/>
+          <a:lstStyle/>
           <a:p>
             <a:r>
               <a:rPr lang="en-IN" altLang="en-US"/>
               <a:t>MyLang.l file</a:t>
             </a:r>
-            <a:endParaRPr lang="en-IN" altLang="en-US"/>
           </a:p>
         </p:txBody>
       </p:sp>
@@ -3215,14 +3207,14 @@
         <p:nvPicPr>
           <p:cNvPr id="4" name="Content Placeholder 3" descr="ip1"/>
           <p:cNvPicPr>
-            <a:picLocks noChangeAspect="1"/>
+            <a:picLocks noGrp="1" noChangeAspect="1"/>
           </p:cNvPicPr>
           <p:nvPr>
             <p:ph idx="1"/>
           </p:nvPr>
         </p:nvPicPr>
         <p:blipFill>
-          <a:blip r:embed="rId1"/>
+          <a:blip r:embed="rId2"/>
           <a:stretch>
             <a:fillRect/>
           </a:stretch>
@@ -3254,7 +3246,14 @@
         <p:cNvGrpSpPr/>
         <p:nvPr/>
       </p:nvGrpSpPr>
-      <p:grpSpPr/>
+      <p:grpSpPr>
+        <a:xfrm>
+          <a:off x="0" y="0"/>
+          <a:ext cx="0" cy="0"/>
+          <a:chOff x="0" y="0"/>
+          <a:chExt cx="0" cy="0"/>
+        </a:xfrm>
+      </p:grpSpPr>
       <p:sp>
         <p:nvSpPr>
           <p:cNvPr id="2" name="Title 1"/>
@@ -3273,12 +3272,12 @@
         </p:spPr>
         <p:txBody>
           <a:bodyPr/>
+          <a:lstStyle/>
           <a:p>
             <a:r>
               <a:rPr lang="en-IN" altLang="en-US"/>
               <a:t>MyLang.y file</a:t>
             </a:r>
-            <a:endParaRPr lang="en-IN" altLang="en-US"/>
           </a:p>
         </p:txBody>
       </p:sp>
@@ -3286,14 +3285,14 @@
         <p:nvPicPr>
           <p:cNvPr id="4" name="Content Placeholder 3" descr="ip2"/>
           <p:cNvPicPr>
-            <a:picLocks noChangeAspect="1"/>
+            <a:picLocks noGrp="1" noChangeAspect="1"/>
           </p:cNvPicPr>
           <p:nvPr>
             <p:ph idx="1"/>
           </p:nvPr>
         </p:nvPicPr>
         <p:blipFill>
-          <a:blip r:embed="rId1"/>
+          <a:blip r:embed="rId2"/>
           <a:stretch>
             <a:fillRect/>
           </a:stretch>
@@ -3325,7 +3324,14 @@
         <p:cNvGrpSpPr/>
         <p:nvPr/>
       </p:nvGrpSpPr>
-      <p:grpSpPr/>
+      <p:grpSpPr>
+        <a:xfrm>
+          <a:off x="0" y="0"/>
+          <a:ext cx="0" cy="0"/>
+          <a:chOff x="0" y="0"/>
+          <a:chExt cx="0" cy="0"/>
+        </a:xfrm>
+      </p:grpSpPr>
       <p:sp>
         <p:nvSpPr>
           <p:cNvPr id="2" name="Title 1"/>
@@ -3339,12 +3345,12 @@
         <p:spPr/>
         <p:txBody>
           <a:bodyPr/>
+          <a:lstStyle/>
           <a:p>
             <a:r>
               <a:rPr lang="en-IN" altLang="en-US"/>
               <a:t>Inputs and Outputs of all secenarios</a:t>
             </a:r>
-            <a:endParaRPr lang="en-IN" altLang="en-US"/>
           </a:p>
         </p:txBody>
       </p:sp>
@@ -3352,14 +3358,14 @@
         <p:nvPicPr>
           <p:cNvPr id="4" name="Content Placeholder 3" descr="op1"/>
           <p:cNvPicPr>
-            <a:picLocks noChangeAspect="1"/>
+            <a:picLocks noGrp="1" noChangeAspect="1"/>
           </p:cNvPicPr>
           <p:nvPr>
             <p:ph sz="half" idx="1"/>
           </p:nvPr>
         </p:nvPicPr>
         <p:blipFill>
-          <a:blip r:embed="rId1"/>
+          <a:blip r:embed="rId2"/>
           <a:stretch>
             <a:fillRect/>
           </a:stretch>
@@ -3378,14 +3384,14 @@
         <p:nvPicPr>
           <p:cNvPr id="7" name="Content Placeholder 6" descr="op2"/>
           <p:cNvPicPr>
-            <a:picLocks noChangeAspect="1"/>
+            <a:picLocks noGrp="1" noChangeAspect="1"/>
           </p:cNvPicPr>
           <p:nvPr>
             <p:ph sz="half" idx="2"/>
           </p:nvPr>
         </p:nvPicPr>
         <p:blipFill>
-          <a:blip r:embed="rId2"/>
+          <a:blip r:embed="rId3"/>
           <a:stretch>
             <a:fillRect/>
           </a:stretch>
@@ -3409,7 +3415,7 @@
           <p:nvPr/>
         </p:nvPicPr>
         <p:blipFill>
-          <a:blip r:embed="rId3"/>
+          <a:blip r:embed="rId4"/>
           <a:stretch>
             <a:fillRect/>
           </a:stretch>
@@ -3433,7 +3439,7 @@
           <p:nvPr/>
         </p:nvPicPr>
         <p:blipFill>
-          <a:blip r:embed="rId4"/>
+          <a:blip r:embed="rId5"/>
           <a:stretch>
             <a:fillRect/>
           </a:stretch>
@@ -3457,7 +3463,7 @@
           <p:nvPr/>
         </p:nvPicPr>
         <p:blipFill>
-          <a:blip r:embed="rId5"/>
+          <a:blip r:embed="rId6"/>
           <a:stretch>
             <a:fillRect/>
           </a:stretch>
@@ -3731,6 +3737,8 @@
       </a:bgFillStyleLst>
     </a:fmtScheme>
   </a:themeElements>
+  <a:objectDefaults/>
+  <a:extraClrSchemeLst/>
   <a:extLst>
     <a:ext uri="{05A4C25C-085E-4340-85A3-A5531E510DB2}">
       <thm15:themeFamily xmlns:thm15="http://schemas.microsoft.com/office/thememl/2012/main" name="Office Theme" id="{62F939B6-93AF-4DB8-9C6B-D6C7DFDC589F}" vid="{4A3C46E8-61CC-4603-A589-7422A47A8E4A}"/>

</xml_diff>